<commit_message>
Criado a versão BRANCA - Adicionado as aopção de colunas de conteúdo, 100% funcional no desk e no moba
</commit_message>
<xml_diff>
--- a/ideias - projeto/ppt34B3.pptm [Salvo automaticamente].pptx
+++ b/ideias - projeto/ppt34B3.pptm [Salvo automaticamente].pptx
@@ -244,7 +244,7 @@
           <a:p>
             <a:fld id="{412E7F55-5637-4AFA-B09B-086D134F9015}" type="datetimeFigureOut">
               <a:rPr lang="pt-BR" smtClean="0"/>
-              <a:t>08/12/2022</a:t>
+              <a:t>11/12/2022</a:t>
             </a:fld>
             <a:endParaRPr lang="pt-BR"/>
           </a:p>
@@ -414,7 +414,7 @@
           <a:p>
             <a:fld id="{412E7F55-5637-4AFA-B09B-086D134F9015}" type="datetimeFigureOut">
               <a:rPr lang="pt-BR" smtClean="0"/>
-              <a:t>08/12/2022</a:t>
+              <a:t>11/12/2022</a:t>
             </a:fld>
             <a:endParaRPr lang="pt-BR"/>
           </a:p>
@@ -594,7 +594,7 @@
           <a:p>
             <a:fld id="{412E7F55-5637-4AFA-B09B-086D134F9015}" type="datetimeFigureOut">
               <a:rPr lang="pt-BR" smtClean="0"/>
-              <a:t>08/12/2022</a:t>
+              <a:t>11/12/2022</a:t>
             </a:fld>
             <a:endParaRPr lang="pt-BR"/>
           </a:p>
@@ -764,7 +764,7 @@
           <a:p>
             <a:fld id="{412E7F55-5637-4AFA-B09B-086D134F9015}" type="datetimeFigureOut">
               <a:rPr lang="pt-BR" smtClean="0"/>
-              <a:t>08/12/2022</a:t>
+              <a:t>11/12/2022</a:t>
             </a:fld>
             <a:endParaRPr lang="pt-BR"/>
           </a:p>
@@ -1010,7 +1010,7 @@
           <a:p>
             <a:fld id="{412E7F55-5637-4AFA-B09B-086D134F9015}" type="datetimeFigureOut">
               <a:rPr lang="pt-BR" smtClean="0"/>
-              <a:t>08/12/2022</a:t>
+              <a:t>11/12/2022</a:t>
             </a:fld>
             <a:endParaRPr lang="pt-BR"/>
           </a:p>
@@ -1242,7 +1242,7 @@
           <a:p>
             <a:fld id="{412E7F55-5637-4AFA-B09B-086D134F9015}" type="datetimeFigureOut">
               <a:rPr lang="pt-BR" smtClean="0"/>
-              <a:t>08/12/2022</a:t>
+              <a:t>11/12/2022</a:t>
             </a:fld>
             <a:endParaRPr lang="pt-BR"/>
           </a:p>
@@ -1609,7 +1609,7 @@
           <a:p>
             <a:fld id="{412E7F55-5637-4AFA-B09B-086D134F9015}" type="datetimeFigureOut">
               <a:rPr lang="pt-BR" smtClean="0"/>
-              <a:t>08/12/2022</a:t>
+              <a:t>11/12/2022</a:t>
             </a:fld>
             <a:endParaRPr lang="pt-BR"/>
           </a:p>
@@ -1727,7 +1727,7 @@
           <a:p>
             <a:fld id="{412E7F55-5637-4AFA-B09B-086D134F9015}" type="datetimeFigureOut">
               <a:rPr lang="pt-BR" smtClean="0"/>
-              <a:t>08/12/2022</a:t>
+              <a:t>11/12/2022</a:t>
             </a:fld>
             <a:endParaRPr lang="pt-BR"/>
           </a:p>
@@ -1822,7 +1822,7 @@
           <a:p>
             <a:fld id="{412E7F55-5637-4AFA-B09B-086D134F9015}" type="datetimeFigureOut">
               <a:rPr lang="pt-BR" smtClean="0"/>
-              <a:t>08/12/2022</a:t>
+              <a:t>11/12/2022</a:t>
             </a:fld>
             <a:endParaRPr lang="pt-BR"/>
           </a:p>
@@ -2099,7 +2099,7 @@
           <a:p>
             <a:fld id="{412E7F55-5637-4AFA-B09B-086D134F9015}" type="datetimeFigureOut">
               <a:rPr lang="pt-BR" smtClean="0"/>
-              <a:t>08/12/2022</a:t>
+              <a:t>11/12/2022</a:t>
             </a:fld>
             <a:endParaRPr lang="pt-BR"/>
           </a:p>
@@ -2356,7 +2356,7 @@
           <a:p>
             <a:fld id="{412E7F55-5637-4AFA-B09B-086D134F9015}" type="datetimeFigureOut">
               <a:rPr lang="pt-BR" smtClean="0"/>
-              <a:t>08/12/2022</a:t>
+              <a:t>11/12/2022</a:t>
             </a:fld>
             <a:endParaRPr lang="pt-BR"/>
           </a:p>
@@ -2569,7 +2569,7 @@
           <a:p>
             <a:fld id="{412E7F55-5637-4AFA-B09B-086D134F9015}" type="datetimeFigureOut">
               <a:rPr lang="pt-BR" smtClean="0"/>
-              <a:t>08/12/2022</a:t>
+              <a:t>11/12/2022</a:t>
             </a:fld>
             <a:endParaRPr lang="pt-BR"/>
           </a:p>

</xml_diff>